<commit_message>
sang update check number and count appeart times of a character
</commit_message>
<xml_diff>
--- a/Slide-Nhom7.pptx
+++ b/Slide-Nhom7.pptx
@@ -24034,192 +24034,144 @@
               <a:buSzPct val="120000"/>
             </a:pPr>
             <a:r>
-              <a:rPr lang="en-US" sz="1400" b="1" err="1">
+              <a:rPr lang="en-US" sz="1400" b="1" dirty="0" err="1">
                 <a:latin typeface="Muli" panose="020B0604020202020204" charset="0"/>
               </a:rPr>
               <a:t>Xử</a:t>
             </a:r>
             <a:r>
-              <a:rPr lang="en-US" sz="1400" b="1">
+              <a:rPr lang="en-US" sz="1400" b="1" dirty="0">
                 <a:latin typeface="Muli" panose="020B0604020202020204" charset="0"/>
               </a:rPr>
               <a:t> </a:t>
             </a:r>
             <a:r>
-              <a:rPr lang="en-US" sz="1400" b="1" err="1">
+              <a:rPr lang="en-US" sz="1400" b="1" dirty="0" err="1">
                 <a:latin typeface="Muli" panose="020B0604020202020204" charset="0"/>
               </a:rPr>
               <a:t>lý</a:t>
             </a:r>
             <a:r>
-              <a:rPr lang="en-US" sz="1400" b="1">
+              <a:rPr lang="en-US" sz="1400" b="1" dirty="0">
                 <a:latin typeface="Muli" panose="020B0604020202020204" charset="0"/>
               </a:rPr>
               <a:t> KEY: </a:t>
             </a:r>
             <a:r>
-              <a:rPr lang="en-US" sz="1400" b="1" err="1">
+              <a:rPr lang="en-US" sz="1400" b="1" dirty="0" err="1">
                 <a:latin typeface="Muli" panose="020B0604020202020204" charset="0"/>
               </a:rPr>
               <a:t>loại</a:t>
             </a:r>
             <a:r>
-              <a:rPr lang="en-US" sz="1400" b="1">
+              <a:rPr lang="en-US" sz="1400" b="1" dirty="0">
                 <a:latin typeface="Muli" panose="020B0604020202020204" charset="0"/>
               </a:rPr>
               <a:t> </a:t>
             </a:r>
             <a:r>
-              <a:rPr lang="en-US" sz="1400" b="1" err="1">
+              <a:rPr lang="en-US" sz="1400" b="1" dirty="0" err="1">
                 <a:latin typeface="Muli" panose="020B0604020202020204" charset="0"/>
               </a:rPr>
               <a:t>bỏ</a:t>
             </a:r>
             <a:r>
-              <a:rPr lang="en-US" sz="1400" b="1">
+              <a:rPr lang="en-US" sz="1400" b="1" dirty="0">
                 <a:latin typeface="Muli" panose="020B0604020202020204" charset="0"/>
               </a:rPr>
               <a:t> </a:t>
             </a:r>
             <a:r>
-              <a:rPr lang="en-US" sz="1400" b="1" err="1">
+              <a:rPr lang="en-US" sz="1400" b="1" dirty="0" err="1">
                 <a:latin typeface="Muli" panose="020B0604020202020204" charset="0"/>
               </a:rPr>
               <a:t>khoảng</a:t>
             </a:r>
             <a:r>
-              <a:rPr lang="en-US" sz="1400" b="1">
+              <a:rPr lang="en-US" sz="1400" b="1" dirty="0">
                 <a:latin typeface="Muli" panose="020B0604020202020204" charset="0"/>
               </a:rPr>
               <a:t> </a:t>
             </a:r>
             <a:r>
-              <a:rPr lang="en-US" sz="1400" b="1" err="1">
+              <a:rPr lang="en-US" sz="1400" b="1" dirty="0" err="1">
                 <a:latin typeface="Muli" panose="020B0604020202020204" charset="0"/>
               </a:rPr>
-              <a:t>trắng,các</a:t>
+              <a:t>trắng</a:t>
             </a:r>
             <a:r>
-              <a:rPr lang="en-US" sz="1400" b="1">
+              <a:rPr lang="en-US" sz="1400" b="1" dirty="0">
                 <a:latin typeface="Muli" panose="020B0604020202020204" charset="0"/>
               </a:rPr>
               <a:t> </a:t>
             </a:r>
             <a:r>
-              <a:rPr lang="en-US" sz="1400" b="1" err="1">
+              <a:rPr lang="en-US" sz="1400" b="1" dirty="0" err="1">
                 <a:latin typeface="Muli" panose="020B0604020202020204" charset="0"/>
               </a:rPr>
-              <a:t>ký</a:t>
+              <a:t>và</a:t>
             </a:r>
             <a:r>
-              <a:rPr lang="en-US" sz="1400" b="1">
+              <a:rPr lang="en-US" sz="1400" b="1" dirty="0">
                 <a:latin typeface="Muli" panose="020B0604020202020204" charset="0"/>
               </a:rPr>
               <a:t> </a:t>
             </a:r>
             <a:r>
-              <a:rPr lang="en-US" sz="1400" b="1" err="1">
+              <a:rPr lang="en-US" sz="1400" b="1" dirty="0" err="1">
                 <a:latin typeface="Muli" panose="020B0604020202020204" charset="0"/>
               </a:rPr>
-              <a:t>tự</a:t>
+              <a:t>chuẩn</a:t>
             </a:r>
             <a:r>
-              <a:rPr lang="en-US" sz="1400" b="1">
+              <a:rPr lang="en-US" sz="1400" b="1" dirty="0">
                 <a:latin typeface="Muli" panose="020B0604020202020204" charset="0"/>
               </a:rPr>
               <a:t> </a:t>
             </a:r>
             <a:r>
-              <a:rPr lang="en-US" sz="1400" b="1" err="1">
+              <a:rPr lang="en-US" sz="1400" b="1" dirty="0" err="1">
                 <a:latin typeface="Muli" panose="020B0604020202020204" charset="0"/>
               </a:rPr>
-              <a:t>đặc</a:t>
+              <a:t>hóa</a:t>
             </a:r>
             <a:r>
-              <a:rPr lang="en-US" sz="1400" b="1">
+              <a:rPr lang="en-US" sz="1400" b="1" dirty="0">
                 <a:latin typeface="Muli" panose="020B0604020202020204" charset="0"/>
               </a:rPr>
               <a:t> </a:t>
             </a:r>
             <a:r>
-              <a:rPr lang="en-US" sz="1400" b="1" err="1">
+              <a:rPr lang="en-US" sz="1400" b="1" dirty="0" err="1">
                 <a:latin typeface="Muli" panose="020B0604020202020204" charset="0"/>
               </a:rPr>
-              <a:t>biệt</a:t>
+              <a:t>về</a:t>
             </a:r>
             <a:r>
-              <a:rPr lang="en-US" sz="1400" b="1">
+              <a:rPr lang="en-US" sz="1400" b="1" dirty="0">
                 <a:latin typeface="Muli" panose="020B0604020202020204" charset="0"/>
               </a:rPr>
               <a:t> </a:t>
             </a:r>
             <a:r>
-              <a:rPr lang="en-US" sz="1400" b="1" err="1">
+              <a:rPr lang="en-US" sz="1400" b="1" dirty="0" err="1">
                 <a:latin typeface="Muli" panose="020B0604020202020204" charset="0"/>
               </a:rPr>
-              <a:t>và</a:t>
+              <a:t>chữ</a:t>
             </a:r>
             <a:r>
-              <a:rPr lang="en-US" sz="1400" b="1">
+              <a:rPr lang="en-US" sz="1400" b="1" dirty="0">
                 <a:latin typeface="Muli" panose="020B0604020202020204" charset="0"/>
               </a:rPr>
               <a:t> </a:t>
             </a:r>
             <a:r>
-              <a:rPr lang="en-US" sz="1400" b="1" err="1">
+              <a:rPr lang="en-US" sz="1400" b="1" dirty="0" err="1">
                 <a:latin typeface="Muli" panose="020B0604020202020204" charset="0"/>
               </a:rPr>
-              <a:t>chuẩn</a:t>
+              <a:t>thường</a:t>
             </a:r>
-            <a:r>
-              <a:rPr lang="en-US" sz="1400" b="1">
-                <a:latin typeface="Muli" panose="020B0604020202020204" charset="0"/>
-              </a:rPr>
-              <a:t> </a:t>
-            </a:r>
-            <a:r>
-              <a:rPr lang="en-US" sz="1400" b="1" err="1">
-                <a:latin typeface="Muli" panose="020B0604020202020204" charset="0"/>
-              </a:rPr>
-              <a:t>hóa</a:t>
-            </a:r>
-            <a:r>
-              <a:rPr lang="en-US" sz="1400" b="1">
-                <a:latin typeface="Muli" panose="020B0604020202020204" charset="0"/>
-              </a:rPr>
-              <a:t> </a:t>
-            </a:r>
-            <a:r>
-              <a:rPr lang="en-US" sz="1400" b="1" err="1">
-                <a:latin typeface="Muli" panose="020B0604020202020204" charset="0"/>
-              </a:rPr>
-              <a:t>về</a:t>
-            </a:r>
-            <a:r>
-              <a:rPr lang="en-US" sz="1400" b="1">
-                <a:latin typeface="Muli" panose="020B0604020202020204" charset="0"/>
-              </a:rPr>
-              <a:t> </a:t>
-            </a:r>
-            <a:r>
-              <a:rPr lang="en-US" sz="1400" b="1" err="1">
-                <a:latin typeface="Muli" panose="020B0604020202020204" charset="0"/>
-              </a:rPr>
-              <a:t>chữ</a:t>
-            </a:r>
-            <a:r>
-              <a:rPr lang="en-US" sz="1400" b="1">
-                <a:latin typeface="Muli" panose="020B0604020202020204" charset="0"/>
-              </a:rPr>
-              <a:t> </a:t>
-            </a:r>
-            <a:r>
-              <a:rPr lang="en-US" sz="1400" b="1" err="1">
-                <a:latin typeface="Muli" panose="020B0604020202020204" charset="0"/>
-              </a:rPr>
-              <a:t>trường</a:t>
-            </a:r>
-            <a:endParaRPr lang="en-US" sz="1400" b="1">
+            <a:endParaRPr lang="en-US" sz="1400" b="1" dirty="0">
               <a:latin typeface="Muli" panose="020B0604020202020204" charset="0"/>
             </a:endParaRPr>
           </a:p>
@@ -26109,216 +26061,168 @@
               <a:buSzPct val="120000"/>
             </a:pPr>
             <a:r>
-              <a:rPr lang="en-US" sz="1400" b="1" err="1">
+              <a:rPr lang="en-US" sz="1400" b="1" dirty="0" err="1">
                 <a:latin typeface="Muli" panose="020B0604020202020204" charset="0"/>
               </a:rPr>
               <a:t>Xử</a:t>
             </a:r>
             <a:r>
-              <a:rPr lang="en-US" sz="1400" b="1">
+              <a:rPr lang="en-US" sz="1400" b="1" dirty="0">
                 <a:latin typeface="Muli" panose="020B0604020202020204" charset="0"/>
               </a:rPr>
               <a:t> </a:t>
             </a:r>
             <a:r>
-              <a:rPr lang="en-US" sz="1400" b="1" err="1">
+              <a:rPr lang="en-US" sz="1400" b="1" dirty="0" err="1">
                 <a:latin typeface="Muli" panose="020B0604020202020204" charset="0"/>
               </a:rPr>
               <a:t>lý</a:t>
             </a:r>
             <a:r>
-              <a:rPr lang="en-US" sz="1400" b="1">
+              <a:rPr lang="en-US" sz="1400" b="1" dirty="0">
                 <a:latin typeface="Muli" panose="020B0604020202020204" charset="0"/>
               </a:rPr>
               <a:t> KEY </a:t>
             </a:r>
             <a:r>
-              <a:rPr lang="en-US" sz="1400" b="1" err="1">
+              <a:rPr lang="en-US" sz="1400" b="1" dirty="0" err="1">
                 <a:latin typeface="Muli" panose="020B0604020202020204" charset="0"/>
               </a:rPr>
               <a:t>nhận</a:t>
             </a:r>
             <a:r>
-              <a:rPr lang="en-US" sz="1400" b="1">
+              <a:rPr lang="en-US" sz="1400" b="1" dirty="0">
                 <a:latin typeface="Muli" panose="020B0604020202020204" charset="0"/>
               </a:rPr>
               <a:t> </a:t>
             </a:r>
             <a:r>
-              <a:rPr lang="en-US" sz="1400" b="1" err="1">
+              <a:rPr lang="en-US" sz="1400" b="1" dirty="0" err="1">
                 <a:latin typeface="Muli" panose="020B0604020202020204" charset="0"/>
               </a:rPr>
               <a:t>được</a:t>
             </a:r>
             <a:r>
-              <a:rPr lang="en-US" sz="1400" b="1">
+              <a:rPr lang="en-US" sz="1400" b="1" dirty="0">
                 <a:latin typeface="Muli" panose="020B0604020202020204" charset="0"/>
               </a:rPr>
               <a:t>: </a:t>
             </a:r>
             <a:r>
-              <a:rPr lang="en-US" sz="1400" b="1" err="1">
+              <a:rPr lang="en-US" sz="1400" b="1" dirty="0" err="1">
                 <a:latin typeface="Muli" panose="020B0604020202020204" charset="0"/>
               </a:rPr>
               <a:t>loại</a:t>
             </a:r>
             <a:r>
-              <a:rPr lang="en-US" sz="1400" b="1">
+              <a:rPr lang="en-US" sz="1400" b="1" dirty="0">
                 <a:latin typeface="Muli" panose="020B0604020202020204" charset="0"/>
               </a:rPr>
               <a:t> </a:t>
             </a:r>
             <a:r>
-              <a:rPr lang="en-US" sz="1400" b="1" err="1">
+              <a:rPr lang="en-US" sz="1400" b="1" dirty="0" err="1">
                 <a:latin typeface="Muli" panose="020B0604020202020204" charset="0"/>
               </a:rPr>
               <a:t>bỏ</a:t>
             </a:r>
             <a:r>
-              <a:rPr lang="en-US" sz="1400" b="1">
+              <a:rPr lang="en-US" sz="1400" b="1" dirty="0">
                 <a:latin typeface="Muli" panose="020B0604020202020204" charset="0"/>
               </a:rPr>
               <a:t> </a:t>
             </a:r>
             <a:r>
-              <a:rPr lang="en-US" sz="1400" b="1" err="1">
+              <a:rPr lang="en-US" sz="1400" b="1" dirty="0" err="1">
                 <a:latin typeface="Muli" panose="020B0604020202020204" charset="0"/>
               </a:rPr>
               <a:t>khoảng</a:t>
             </a:r>
             <a:r>
-              <a:rPr lang="en-US" sz="1400" b="1">
+              <a:rPr lang="en-US" sz="1400" b="1" dirty="0">
                 <a:latin typeface="Muli" panose="020B0604020202020204" charset="0"/>
               </a:rPr>
               <a:t> </a:t>
             </a:r>
             <a:r>
-              <a:rPr lang="en-US" sz="1400" b="1" err="1">
+              <a:rPr lang="en-US" sz="1400" b="1" dirty="0" err="1">
                 <a:latin typeface="Muli" panose="020B0604020202020204" charset="0"/>
               </a:rPr>
-              <a:t>trắng,các</a:t>
+              <a:t>trắng</a:t>
             </a:r>
             <a:r>
-              <a:rPr lang="en-US" sz="1400" b="1">
+              <a:rPr lang="en-US" sz="1400" b="1" dirty="0">
                 <a:latin typeface="Muli" panose="020B0604020202020204" charset="0"/>
               </a:rPr>
               <a:t> </a:t>
             </a:r>
             <a:r>
-              <a:rPr lang="en-US" sz="1400" b="1" err="1">
+              <a:rPr lang="en-US" sz="1400" b="1" dirty="0" err="1">
                 <a:latin typeface="Muli" panose="020B0604020202020204" charset="0"/>
               </a:rPr>
-              <a:t>ký</a:t>
+              <a:t>và</a:t>
             </a:r>
             <a:r>
-              <a:rPr lang="en-US" sz="1400" b="1">
+              <a:rPr lang="en-US" sz="1400" b="1" dirty="0">
                 <a:latin typeface="Muli" panose="020B0604020202020204" charset="0"/>
               </a:rPr>
               <a:t> </a:t>
             </a:r>
             <a:r>
-              <a:rPr lang="en-US" sz="1400" b="1" err="1">
+              <a:rPr lang="en-US" sz="1400" b="1" dirty="0" err="1">
                 <a:latin typeface="Muli" panose="020B0604020202020204" charset="0"/>
               </a:rPr>
-              <a:t>tự</a:t>
+              <a:t>chuẩn</a:t>
             </a:r>
             <a:r>
-              <a:rPr lang="en-US" sz="1400" b="1">
+              <a:rPr lang="en-US" sz="1400" b="1" dirty="0">
                 <a:latin typeface="Muli" panose="020B0604020202020204" charset="0"/>
               </a:rPr>
               <a:t> </a:t>
             </a:r>
             <a:r>
-              <a:rPr lang="en-US" sz="1400" b="1" err="1">
+              <a:rPr lang="en-US" sz="1400" b="1" dirty="0" err="1">
                 <a:latin typeface="Muli" panose="020B0604020202020204" charset="0"/>
               </a:rPr>
-              <a:t>đặc</a:t>
+              <a:t>hóa</a:t>
             </a:r>
             <a:r>
-              <a:rPr lang="en-US" sz="1400" b="1">
+              <a:rPr lang="en-US" sz="1400" b="1" dirty="0">
                 <a:latin typeface="Muli" panose="020B0604020202020204" charset="0"/>
               </a:rPr>
               <a:t> </a:t>
             </a:r>
             <a:r>
-              <a:rPr lang="en-US" sz="1400" b="1" err="1">
+              <a:rPr lang="en-US" sz="1400" b="1" dirty="0" err="1">
                 <a:latin typeface="Muli" panose="020B0604020202020204" charset="0"/>
               </a:rPr>
-              <a:t>biệt</a:t>
+              <a:t>về</a:t>
             </a:r>
             <a:r>
-              <a:rPr lang="en-US" sz="1400" b="1">
+              <a:rPr lang="en-US" sz="1400" b="1" dirty="0">
                 <a:latin typeface="Muli" panose="020B0604020202020204" charset="0"/>
               </a:rPr>
               <a:t> </a:t>
             </a:r>
             <a:r>
-              <a:rPr lang="en-US" sz="1400" b="1" err="1">
+              <a:rPr lang="en-US" sz="1400" b="1" dirty="0" err="1">
                 <a:latin typeface="Muli" panose="020B0604020202020204" charset="0"/>
               </a:rPr>
-              <a:t>và</a:t>
+              <a:t>chữ</a:t>
             </a:r>
             <a:r>
-              <a:rPr lang="en-US" sz="1400" b="1">
+              <a:rPr lang="en-US" sz="1400" b="1" dirty="0">
                 <a:latin typeface="Muli" panose="020B0604020202020204" charset="0"/>
               </a:rPr>
               <a:t> </a:t>
             </a:r>
             <a:r>
-              <a:rPr lang="en-US" sz="1400" b="1" err="1">
+              <a:rPr lang="en-US" sz="1400" b="1" dirty="0" err="1">
                 <a:latin typeface="Muli" panose="020B0604020202020204" charset="0"/>
               </a:rPr>
-              <a:t>chuẩn</a:t>
+              <a:t>thường</a:t>
             </a:r>
-            <a:r>
-              <a:rPr lang="en-US" sz="1400" b="1">
-                <a:latin typeface="Muli" panose="020B0604020202020204" charset="0"/>
-              </a:rPr>
-              <a:t> </a:t>
-            </a:r>
-            <a:r>
-              <a:rPr lang="en-US" sz="1400" b="1" err="1">
-                <a:latin typeface="Muli" panose="020B0604020202020204" charset="0"/>
-              </a:rPr>
-              <a:t>hóa</a:t>
-            </a:r>
-            <a:r>
-              <a:rPr lang="en-US" sz="1400" b="1">
-                <a:latin typeface="Muli" panose="020B0604020202020204" charset="0"/>
-              </a:rPr>
-              <a:t> </a:t>
-            </a:r>
-            <a:r>
-              <a:rPr lang="en-US" sz="1400" b="1" err="1">
-                <a:latin typeface="Muli" panose="020B0604020202020204" charset="0"/>
-              </a:rPr>
-              <a:t>về</a:t>
-            </a:r>
-            <a:r>
-              <a:rPr lang="en-US" sz="1400" b="1">
-                <a:latin typeface="Muli" panose="020B0604020202020204" charset="0"/>
-              </a:rPr>
-              <a:t> </a:t>
-            </a:r>
-            <a:r>
-              <a:rPr lang="en-US" sz="1400" b="1" err="1">
-                <a:latin typeface="Muli" panose="020B0604020202020204" charset="0"/>
-              </a:rPr>
-              <a:t>chữ</a:t>
-            </a:r>
-            <a:r>
-              <a:rPr lang="en-US" sz="1400" b="1">
-                <a:latin typeface="Muli" panose="020B0604020202020204" charset="0"/>
-              </a:rPr>
-              <a:t> </a:t>
-            </a:r>
-            <a:r>
-              <a:rPr lang="en-US" sz="1400" b="1" err="1">
-                <a:latin typeface="Muli" panose="020B0604020202020204" charset="0"/>
-              </a:rPr>
-              <a:t>trường</a:t>
-            </a:r>
-            <a:endParaRPr lang="en-US" sz="1400" b="1">
+            <a:endParaRPr lang="en-US" sz="1400" b="1" dirty="0">
               <a:latin typeface="Muli" panose="020B0604020202020204" charset="0"/>
             </a:endParaRPr>
           </a:p>
@@ -27616,276 +27520,240 @@
               <a:buSzPct val="120000"/>
             </a:pPr>
             <a:r>
-              <a:rPr lang="en-US" sz="1400" b="1" err="1">
+              <a:rPr lang="en-US" sz="1400" b="1" dirty="0" err="1">
                 <a:latin typeface="Muli" panose="020B0604020202020204" charset="0"/>
               </a:rPr>
               <a:t>Bỏ</a:t>
             </a:r>
             <a:r>
-              <a:rPr lang="en-US" sz="1400" b="1">
+              <a:rPr lang="en-US" sz="1400" b="1" dirty="0">
                 <a:latin typeface="Muli" panose="020B0604020202020204" charset="0"/>
               </a:rPr>
               <a:t> qua </a:t>
             </a:r>
             <a:r>
-              <a:rPr lang="en-US" sz="1400" b="1" err="1">
+              <a:rPr lang="en-US" sz="1400" b="1" dirty="0" err="1">
                 <a:latin typeface="Muli" panose="020B0604020202020204" charset="0"/>
               </a:rPr>
               <a:t>các</a:t>
             </a:r>
             <a:r>
-              <a:rPr lang="en-US" sz="1400" b="1">
+              <a:rPr lang="en-US" sz="1400" b="1" dirty="0">
                 <a:latin typeface="Muli" panose="020B0604020202020204" charset="0"/>
               </a:rPr>
               <a:t> </a:t>
             </a:r>
             <a:r>
-              <a:rPr lang="en-US" sz="1400" b="1" err="1">
+              <a:rPr lang="en-US" sz="1400" b="1" dirty="0" err="1">
                 <a:latin typeface="Muli" panose="020B0604020202020204" charset="0"/>
               </a:rPr>
               <a:t>ký</a:t>
             </a:r>
             <a:r>
-              <a:rPr lang="en-US" sz="1400" b="1">
+              <a:rPr lang="en-US" sz="1400" b="1" dirty="0">
                 <a:latin typeface="Muli" panose="020B0604020202020204" charset="0"/>
               </a:rPr>
               <a:t> </a:t>
             </a:r>
             <a:r>
-              <a:rPr lang="en-US" sz="1400" b="1" err="1">
+              <a:rPr lang="en-US" sz="1400" b="1" dirty="0" err="1">
                 <a:latin typeface="Muli" panose="020B0604020202020204" charset="0"/>
               </a:rPr>
               <a:t>tự</a:t>
             </a:r>
             <a:r>
-              <a:rPr lang="en-US" sz="1400" b="1">
+              <a:rPr lang="en-US" sz="1400" b="1" dirty="0">
                 <a:latin typeface="Muli" panose="020B0604020202020204" charset="0"/>
               </a:rPr>
               <a:t> </a:t>
             </a:r>
             <a:r>
-              <a:rPr lang="en-US" sz="1400" b="1" err="1">
+              <a:rPr lang="en-US" sz="1400" b="1" dirty="0" err="1">
                 <a:latin typeface="Muli" panose="020B0604020202020204" charset="0"/>
               </a:rPr>
               <a:t>khoảng</a:t>
             </a:r>
             <a:r>
-              <a:rPr lang="en-US" sz="1400" b="1">
+              <a:rPr lang="en-US" sz="1400" b="1" dirty="0">
                 <a:latin typeface="Muli" panose="020B0604020202020204" charset="0"/>
               </a:rPr>
               <a:t> </a:t>
             </a:r>
             <a:r>
-              <a:rPr lang="en-US" sz="1400" b="1" err="1">
+              <a:rPr lang="en-US" sz="1400" b="1" dirty="0" err="1">
                 <a:latin typeface="Muli" panose="020B0604020202020204" charset="0"/>
               </a:rPr>
               <a:t>trắng</a:t>
             </a:r>
             <a:r>
-              <a:rPr lang="en-US" sz="1400" b="1">
+              <a:rPr lang="en-US" sz="1400" b="1" dirty="0">
+                <a:latin typeface="Muli" panose="020B0604020202020204" charset="0"/>
+              </a:rPr>
+              <a:t>. </a:t>
+            </a:r>
+            <a:r>
+              <a:rPr lang="en-US" sz="1400" b="1" dirty="0" err="1">
+                <a:latin typeface="Muli" panose="020B0604020202020204" charset="0"/>
+              </a:rPr>
+              <a:t>Tìm</a:t>
+            </a:r>
+            <a:r>
+              <a:rPr lang="en-US" sz="1400" b="1" dirty="0">
+                <a:latin typeface="Muli" panose="020B0604020202020204" charset="0"/>
+              </a:rPr>
+              <a:t> </a:t>
+            </a:r>
+            <a:r>
+              <a:rPr lang="en-US" sz="1400" b="1" dirty="0" err="1">
+                <a:latin typeface="Muli" panose="020B0604020202020204" charset="0"/>
+              </a:rPr>
+              <a:t>ký</a:t>
+            </a:r>
+            <a:r>
+              <a:rPr lang="en-US" sz="1400" b="1" dirty="0">
+                <a:latin typeface="Muli" panose="020B0604020202020204" charset="0"/>
+              </a:rPr>
+              <a:t> </a:t>
+            </a:r>
+            <a:r>
+              <a:rPr lang="en-US" sz="1400" b="1" dirty="0" err="1">
+                <a:latin typeface="Muli" panose="020B0604020202020204" charset="0"/>
+              </a:rPr>
+              <a:t>tự</a:t>
+            </a:r>
+            <a:r>
+              <a:rPr lang="en-US" sz="1400" b="1" dirty="0">
+                <a:latin typeface="Muli" panose="020B0604020202020204" charset="0"/>
+              </a:rPr>
+              <a:t> </a:t>
+            </a:r>
+            <a:r>
+              <a:rPr lang="en-US" sz="1400" b="1" dirty="0" err="1">
+                <a:latin typeface="Muli" panose="020B0604020202020204" charset="0"/>
+              </a:rPr>
+              <a:t>xuất</a:t>
+            </a:r>
+            <a:r>
+              <a:rPr lang="en-US" sz="1400" b="1" dirty="0">
+                <a:latin typeface="Muli" panose="020B0604020202020204" charset="0"/>
+              </a:rPr>
+              <a:t> </a:t>
+            </a:r>
+            <a:r>
+              <a:rPr lang="en-US" sz="1400" b="1" dirty="0" err="1">
+                <a:latin typeface="Muli" panose="020B0604020202020204" charset="0"/>
+              </a:rPr>
+              <a:t>hiện</a:t>
+            </a:r>
+            <a:r>
+              <a:rPr lang="en-US" sz="1400" b="1" dirty="0">
+                <a:latin typeface="Muli" panose="020B0604020202020204" charset="0"/>
+              </a:rPr>
+              <a:t> </a:t>
+            </a:r>
+            <a:r>
+              <a:rPr lang="en-US" sz="1400" b="1" dirty="0" err="1">
+                <a:latin typeface="Muli" panose="020B0604020202020204" charset="0"/>
+              </a:rPr>
+              <a:t>nhiều</a:t>
+            </a:r>
+            <a:r>
+              <a:rPr lang="en-US" sz="1400" b="1" dirty="0">
+                <a:latin typeface="Muli" panose="020B0604020202020204" charset="0"/>
+              </a:rPr>
+              <a:t> </a:t>
+            </a:r>
+            <a:r>
+              <a:rPr lang="en-US" sz="1400" b="1" dirty="0" err="1">
+                <a:latin typeface="Muli" panose="020B0604020202020204" charset="0"/>
+              </a:rPr>
+              <a:t>nhất</a:t>
+            </a:r>
+            <a:r>
+              <a:rPr lang="en-US" sz="1400" b="1" dirty="0">
+                <a:latin typeface="Muli" panose="020B0604020202020204" charset="0"/>
+              </a:rPr>
+              <a:t> </a:t>
+            </a:r>
+            <a:r>
+              <a:rPr lang="en-US" sz="1400" b="1" dirty="0" err="1">
+                <a:latin typeface="Muli" panose="020B0604020202020204" charset="0"/>
+              </a:rPr>
+              <a:t>không</a:t>
+            </a:r>
+            <a:r>
+              <a:rPr lang="en-US" sz="1400" b="1" dirty="0">
+                <a:latin typeface="Muli" panose="020B0604020202020204" charset="0"/>
+              </a:rPr>
+              <a:t> </a:t>
+            </a:r>
+            <a:r>
+              <a:rPr lang="en-US" sz="1400" b="1" dirty="0" err="1">
+                <a:latin typeface="Muli" panose="020B0604020202020204" charset="0"/>
+              </a:rPr>
+              <a:t>phân</a:t>
+            </a:r>
+            <a:r>
+              <a:rPr lang="en-US" sz="1400" b="1" dirty="0">
+                <a:latin typeface="Muli" panose="020B0604020202020204" charset="0"/>
+              </a:rPr>
+              <a:t> </a:t>
+            </a:r>
+            <a:r>
+              <a:rPr lang="en-US" sz="1400" b="1" dirty="0" err="1">
+                <a:latin typeface="Muli" panose="020B0604020202020204" charset="0"/>
+              </a:rPr>
+              <a:t>biệt</a:t>
+            </a:r>
+            <a:r>
+              <a:rPr lang="en-US" sz="1400" b="1" dirty="0">
+                <a:latin typeface="Muli" panose="020B0604020202020204" charset="0"/>
+              </a:rPr>
+              <a:t> </a:t>
+            </a:r>
+            <a:r>
+              <a:rPr lang="en-US" sz="1400" b="1" dirty="0" err="1">
+                <a:latin typeface="Muli" panose="020B0604020202020204" charset="0"/>
+              </a:rPr>
+              <a:t>chữ</a:t>
+            </a:r>
+            <a:r>
+              <a:rPr lang="en-US" sz="1400" b="1" dirty="0">
+                <a:latin typeface="Muli" panose="020B0604020202020204" charset="0"/>
+              </a:rPr>
+              <a:t> </a:t>
+            </a:r>
+            <a:r>
+              <a:rPr lang="en-US" sz="1400" b="1" dirty="0" err="1">
+                <a:latin typeface="Muli" panose="020B0604020202020204" charset="0"/>
+              </a:rPr>
+              <a:t>hoa</a:t>
+            </a:r>
+            <a:r>
+              <a:rPr lang="en-US" sz="1400" b="1" dirty="0">
                 <a:latin typeface="Muli" panose="020B0604020202020204" charset="0"/>
               </a:rPr>
               <a:t>, </a:t>
             </a:r>
             <a:r>
-              <a:rPr lang="en-US" sz="1400" b="1" err="1">
+              <a:rPr lang="en-US" sz="1400" b="1" dirty="0" err="1">
                 <a:latin typeface="Muli" panose="020B0604020202020204" charset="0"/>
               </a:rPr>
-              <a:t>ký</a:t>
+              <a:t>chữ</a:t>
             </a:r>
             <a:r>
-              <a:rPr lang="en-US" sz="1400" b="1">
+              <a:rPr lang="en-US" sz="1400" b="1" dirty="0">
                 <a:latin typeface="Muli" panose="020B0604020202020204" charset="0"/>
               </a:rPr>
               <a:t> </a:t>
             </a:r>
             <a:r>
-              <a:rPr lang="en-US" sz="1400" b="1" err="1">
+              <a:rPr lang="en-US" sz="1400" b="1" dirty="0" err="1">
                 <a:latin typeface="Muli" panose="020B0604020202020204" charset="0"/>
               </a:rPr>
-              <a:t>tự</a:t>
+              <a:t>thường</a:t>
             </a:r>
-            <a:r>
-              <a:rPr lang="en-US" sz="1400" b="1">
-                <a:latin typeface="Muli" panose="020B0604020202020204" charset="0"/>
-              </a:rPr>
-              <a:t> </a:t>
-            </a:r>
-            <a:r>
-              <a:rPr lang="en-US" sz="1400" b="1" err="1">
-                <a:latin typeface="Muli" panose="020B0604020202020204" charset="0"/>
-              </a:rPr>
-              <a:t>đặc</a:t>
-            </a:r>
-            <a:r>
-              <a:rPr lang="en-US" sz="1400" b="1">
-                <a:latin typeface="Muli" panose="020B0604020202020204" charset="0"/>
-              </a:rPr>
-              <a:t> </a:t>
-            </a:r>
-            <a:r>
-              <a:rPr lang="en-US" sz="1400" b="1" err="1">
-                <a:latin typeface="Muli" panose="020B0604020202020204" charset="0"/>
-              </a:rPr>
-              <a:t>biệt</a:t>
-            </a:r>
-            <a:r>
-              <a:rPr lang="en-US" sz="1400" b="1">
-                <a:latin typeface="Muli" panose="020B0604020202020204" charset="0"/>
-              </a:rPr>
-              <a:t>. </a:t>
-            </a:r>
-            <a:r>
-              <a:rPr lang="en-US" sz="1400" b="1" err="1">
-                <a:latin typeface="Muli" panose="020B0604020202020204" charset="0"/>
-              </a:rPr>
-              <a:t>Tìm</a:t>
-            </a:r>
-            <a:r>
-              <a:rPr lang="en-US" sz="1400" b="1">
-                <a:latin typeface="Muli" panose="020B0604020202020204" charset="0"/>
-              </a:rPr>
-              <a:t> </a:t>
-            </a:r>
-            <a:r>
-              <a:rPr lang="en-US" sz="1400" b="1" err="1">
-                <a:latin typeface="Muli" panose="020B0604020202020204" charset="0"/>
-              </a:rPr>
-              <a:t>ký</a:t>
-            </a:r>
-            <a:r>
-              <a:rPr lang="en-US" sz="1400" b="1">
-                <a:latin typeface="Muli" panose="020B0604020202020204" charset="0"/>
-              </a:rPr>
-              <a:t> </a:t>
-            </a:r>
-            <a:r>
-              <a:rPr lang="en-US" sz="1400" b="1" err="1">
-                <a:latin typeface="Muli" panose="020B0604020202020204" charset="0"/>
-              </a:rPr>
-              <a:t>tự</a:t>
-            </a:r>
-            <a:r>
-              <a:rPr lang="en-US" sz="1400" b="1">
-                <a:latin typeface="Muli" panose="020B0604020202020204" charset="0"/>
-              </a:rPr>
-              <a:t> </a:t>
-            </a:r>
-            <a:r>
-              <a:rPr lang="en-US" sz="1400" b="1" err="1">
-                <a:latin typeface="Muli" panose="020B0604020202020204" charset="0"/>
-              </a:rPr>
-              <a:t>xuất</a:t>
-            </a:r>
-            <a:r>
-              <a:rPr lang="en-US" sz="1400" b="1">
-                <a:latin typeface="Muli" panose="020B0604020202020204" charset="0"/>
-              </a:rPr>
-              <a:t> </a:t>
-            </a:r>
-            <a:r>
-              <a:rPr lang="en-US" sz="1400" b="1" err="1">
-                <a:latin typeface="Muli" panose="020B0604020202020204" charset="0"/>
-              </a:rPr>
-              <a:t>hiện</a:t>
-            </a:r>
-            <a:r>
-              <a:rPr lang="en-US" sz="1400" b="1">
-                <a:latin typeface="Muli" panose="020B0604020202020204" charset="0"/>
-              </a:rPr>
-              <a:t> </a:t>
-            </a:r>
-            <a:r>
-              <a:rPr lang="en-US" sz="1400" b="1" err="1">
-                <a:latin typeface="Muli" panose="020B0604020202020204" charset="0"/>
-              </a:rPr>
-              <a:t>nhiều</a:t>
-            </a:r>
-            <a:r>
-              <a:rPr lang="en-US" sz="1400" b="1">
-                <a:latin typeface="Muli" panose="020B0604020202020204" charset="0"/>
-              </a:rPr>
-              <a:t> </a:t>
-            </a:r>
-            <a:r>
-              <a:rPr lang="en-US" sz="1400" b="1" err="1">
-                <a:latin typeface="Muli" panose="020B0604020202020204" charset="0"/>
-              </a:rPr>
-              <a:t>nhất</a:t>
-            </a:r>
-            <a:r>
-              <a:rPr lang="en-US" sz="1400" b="1">
-                <a:latin typeface="Muli" panose="020B0604020202020204" charset="0"/>
-              </a:rPr>
-              <a:t> </a:t>
-            </a:r>
-            <a:r>
-              <a:rPr lang="en-US" sz="1400" b="1" err="1">
-                <a:latin typeface="Muli" panose="020B0604020202020204" charset="0"/>
-              </a:rPr>
-              <a:t>không</a:t>
-            </a:r>
-            <a:r>
-              <a:rPr lang="en-US" sz="1400" b="1">
-                <a:latin typeface="Muli" panose="020B0604020202020204" charset="0"/>
-              </a:rPr>
-              <a:t> </a:t>
-            </a:r>
-            <a:r>
-              <a:rPr lang="en-US" sz="1400" b="1" err="1">
-                <a:latin typeface="Muli" panose="020B0604020202020204" charset="0"/>
-              </a:rPr>
-              <a:t>phân</a:t>
-            </a:r>
-            <a:r>
-              <a:rPr lang="en-US" sz="1400" b="1">
-                <a:latin typeface="Muli" panose="020B0604020202020204" charset="0"/>
-              </a:rPr>
-              <a:t> </a:t>
-            </a:r>
-            <a:r>
-              <a:rPr lang="en-US" sz="1400" b="1" err="1">
-                <a:latin typeface="Muli" panose="020B0604020202020204" charset="0"/>
-              </a:rPr>
-              <a:t>biệt</a:t>
-            </a:r>
-            <a:r>
-              <a:rPr lang="en-US" sz="1400" b="1">
-                <a:latin typeface="Muli" panose="020B0604020202020204" charset="0"/>
-              </a:rPr>
-              <a:t> </a:t>
-            </a:r>
-            <a:r>
-              <a:rPr lang="en-US" sz="1400" b="1" err="1">
-                <a:latin typeface="Muli" panose="020B0604020202020204" charset="0"/>
-              </a:rPr>
-              <a:t>chữ</a:t>
-            </a:r>
-            <a:r>
-              <a:rPr lang="en-US" sz="1400" b="1">
-                <a:latin typeface="Muli" panose="020B0604020202020204" charset="0"/>
-              </a:rPr>
-              <a:t> </a:t>
-            </a:r>
-            <a:r>
-              <a:rPr lang="en-US" sz="1400" b="1" err="1">
-                <a:latin typeface="Muli" panose="020B0604020202020204" charset="0"/>
-              </a:rPr>
-              <a:t>hoa</a:t>
-            </a:r>
-            <a:r>
-              <a:rPr lang="en-US" sz="1400" b="1">
-                <a:latin typeface="Muli" panose="020B0604020202020204" charset="0"/>
-              </a:rPr>
-              <a:t>, </a:t>
-            </a:r>
-            <a:r>
-              <a:rPr lang="en-US" sz="1400" b="1" err="1">
-                <a:latin typeface="Muli" panose="020B0604020202020204" charset="0"/>
-              </a:rPr>
-              <a:t>chữthường</a:t>
-            </a:r>
-            <a:endParaRPr lang="en-US" sz="1400" b="1">
+            <a:endParaRPr lang="en-US" sz="1400" b="1" dirty="0">
               <a:latin typeface="Muli" panose="020B0604020202020204" charset="0"/>
             </a:endParaRPr>
           </a:p>
@@ -28175,6 +28043,36 @@
           <a:chExt cx="0" cy="0"/>
         </a:xfrm>
       </p:grpSpPr>
+      <p:pic>
+        <p:nvPicPr>
+          <p:cNvPr id="4" name="Picture 3">
+            <a:extLst>
+              <a:ext uri="{FF2B5EF4-FFF2-40B4-BE49-F238E27FC236}">
+                <a16:creationId xmlns:a16="http://schemas.microsoft.com/office/drawing/2014/main" id="{8C331E89-2037-4852-912B-B50B624DF795}"/>
+              </a:ext>
+            </a:extLst>
+          </p:cNvPr>
+          <p:cNvPicPr>
+            <a:picLocks noChangeAspect="1"/>
+          </p:cNvPicPr>
+          <p:nvPr/>
+        </p:nvPicPr>
+        <p:blipFill>
+          <a:blip r:embed="rId3"/>
+          <a:stretch>
+            <a:fillRect/>
+          </a:stretch>
+        </p:blipFill>
+        <p:spPr>
+          <a:xfrm>
+            <a:off x="2785052" y="2063299"/>
+            <a:ext cx="4422135" cy="2889969"/>
+          </a:xfrm>
+          <a:prstGeom prst="rect">
+            <a:avLst/>
+          </a:prstGeom>
+        </p:spPr>
+      </p:pic>
       <p:sp>
         <p:nvSpPr>
           <p:cNvPr id="367" name="Google Shape;367;p15"/>
@@ -29019,36 +28917,6 @@
           </a:p>
         </p:txBody>
       </p:sp>
-      <p:pic>
-        <p:nvPicPr>
-          <p:cNvPr id="3" name="Picture 2">
-            <a:extLst>
-              <a:ext uri="{FF2B5EF4-FFF2-40B4-BE49-F238E27FC236}">
-                <a16:creationId xmlns:a16="http://schemas.microsoft.com/office/drawing/2014/main" id="{992979B2-D806-40F4-9143-D99E0D843E1E}"/>
-              </a:ext>
-            </a:extLst>
-          </p:cNvPr>
-          <p:cNvPicPr>
-            <a:picLocks noChangeAspect="1"/>
-          </p:cNvPicPr>
-          <p:nvPr/>
-        </p:nvPicPr>
-        <p:blipFill>
-          <a:blip r:embed="rId3"/>
-          <a:stretch>
-            <a:fillRect/>
-          </a:stretch>
-        </p:blipFill>
-        <p:spPr>
-          <a:xfrm>
-            <a:off x="2745691" y="1796728"/>
-            <a:ext cx="4577615" cy="3079487"/>
-          </a:xfrm>
-          <a:prstGeom prst="rect">
-            <a:avLst/>
-          </a:prstGeom>
-        </p:spPr>
-      </p:pic>
       <p:cxnSp>
         <p:nvCxnSpPr>
           <p:cNvPr id="6" name="Straight Arrow Connector 5">
@@ -29147,8 +29015,8 @@
         </p:nvCxnSpPr>
         <p:spPr>
           <a:xfrm flipH="1">
-            <a:off x="7119257" y="2278743"/>
-            <a:ext cx="1197431" cy="293007"/>
+            <a:off x="6907619" y="2278743"/>
+            <a:ext cx="1409070" cy="566680"/>
           </a:xfrm>
           <a:prstGeom prst="straightConnector1">
             <a:avLst/>
@@ -29188,8 +29056,8 @@
         </p:nvCxnSpPr>
         <p:spPr>
           <a:xfrm flipH="1">
-            <a:off x="5718629" y="4176825"/>
-            <a:ext cx="2499797" cy="395175"/>
+            <a:off x="5834743" y="4176825"/>
+            <a:ext cx="2383684" cy="256270"/>
           </a:xfrm>
           <a:prstGeom prst="straightConnector1">
             <a:avLst/>
@@ -29694,7 +29562,7 @@
                             </p:stCondLst>
                             <p:childTnLst>
                               <p:par>
-                                <p:cTn id="9" presetID="2" presetClass="entr" presetSubtype="4" fill="hold" nodeType="afterEffect">
+                                <p:cTn id="9" presetID="53" presetClass="entr" presetSubtype="16" fill="hold" grpId="0" nodeType="afterEffect">
                                   <p:stCondLst>
                                     <p:cond delay="0"/>
                                   </p:stCondLst>
@@ -29702,88 +29570,6 @@
                                     <p:set>
                                       <p:cBhvr>
                                         <p:cTn id="10" dur="1" fill="hold">
-                                          <p:stCondLst>
-                                            <p:cond delay="0"/>
-                                          </p:stCondLst>
-                                        </p:cTn>
-                                        <p:tgtEl>
-                                          <p:spTgt spid="3"/>
-                                        </p:tgtEl>
-                                        <p:attrNameLst>
-                                          <p:attrName>style.visibility</p:attrName>
-                                        </p:attrNameLst>
-                                      </p:cBhvr>
-                                      <p:to>
-                                        <p:strVal val="visible"/>
-                                      </p:to>
-                                    </p:set>
-                                    <p:anim calcmode="lin" valueType="num">
-                                      <p:cBhvr additive="base">
-                                        <p:cTn id="11" dur="250" fill="hold"/>
-                                        <p:tgtEl>
-                                          <p:spTgt spid="3"/>
-                                        </p:tgtEl>
-                                        <p:attrNameLst>
-                                          <p:attrName>ppt_x</p:attrName>
-                                        </p:attrNameLst>
-                                      </p:cBhvr>
-                                      <p:tavLst>
-                                        <p:tav tm="0">
-                                          <p:val>
-                                            <p:strVal val="#ppt_x"/>
-                                          </p:val>
-                                        </p:tav>
-                                        <p:tav tm="100000">
-                                          <p:val>
-                                            <p:strVal val="#ppt_x"/>
-                                          </p:val>
-                                        </p:tav>
-                                      </p:tavLst>
-                                    </p:anim>
-                                    <p:anim calcmode="lin" valueType="num">
-                                      <p:cBhvr additive="base">
-                                        <p:cTn id="12" dur="250" fill="hold"/>
-                                        <p:tgtEl>
-                                          <p:spTgt spid="3"/>
-                                        </p:tgtEl>
-                                        <p:attrNameLst>
-                                          <p:attrName>ppt_y</p:attrName>
-                                        </p:attrNameLst>
-                                      </p:cBhvr>
-                                      <p:tavLst>
-                                        <p:tav tm="0">
-                                          <p:val>
-                                            <p:strVal val="1+#ppt_h/2"/>
-                                          </p:val>
-                                        </p:tav>
-                                        <p:tav tm="100000">
-                                          <p:val>
-                                            <p:strVal val="#ppt_y"/>
-                                          </p:val>
-                                        </p:tav>
-                                      </p:tavLst>
-                                    </p:anim>
-                                  </p:childTnLst>
-                                </p:cTn>
-                              </p:par>
-                            </p:childTnLst>
-                          </p:cTn>
-                        </p:par>
-                        <p:par>
-                          <p:cTn id="13" fill="hold">
-                            <p:stCondLst>
-                              <p:cond delay="500"/>
-                            </p:stCondLst>
-                            <p:childTnLst>
-                              <p:par>
-                                <p:cTn id="14" presetID="53" presetClass="entr" presetSubtype="16" fill="hold" grpId="0" nodeType="afterEffect">
-                                  <p:stCondLst>
-                                    <p:cond delay="0"/>
-                                  </p:stCondLst>
-                                  <p:childTnLst>
-                                    <p:set>
-                                      <p:cBhvr>
-                                        <p:cTn id="15" dur="1" fill="hold">
                                           <p:stCondLst>
                                             <p:cond delay="0"/>
                                           </p:stCondLst>
@@ -29801,7 +29587,7 @@
                                     </p:set>
                                     <p:anim calcmode="lin" valueType="num">
                                       <p:cBhvr>
-                                        <p:cTn id="16" dur="250" fill="hold"/>
+                                        <p:cTn id="11" dur="250" fill="hold"/>
                                         <p:tgtEl>
                                           <p:spTgt spid="21"/>
                                         </p:tgtEl>
@@ -29824,7 +29610,7 @@
                                     </p:anim>
                                     <p:anim calcmode="lin" valueType="num">
                                       <p:cBhvr>
-                                        <p:cTn id="17" dur="250" fill="hold"/>
+                                        <p:cTn id="12" dur="250" fill="hold"/>
                                         <p:tgtEl>
                                           <p:spTgt spid="21"/>
                                         </p:tgtEl>
@@ -29847,7 +29633,7 @@
                                     </p:anim>
                                     <p:animEffect transition="in" filter="fade">
                                       <p:cBhvr>
-                                        <p:cTn id="18" dur="250"/>
+                                        <p:cTn id="13" dur="250"/>
                                         <p:tgtEl>
                                           <p:spTgt spid="21"/>
                                         </p:tgtEl>
@@ -29857,14 +29643,14 @@
                                 </p:cTn>
                               </p:par>
                               <p:par>
-                                <p:cTn id="19" presetID="53" presetClass="entr" presetSubtype="16" fill="hold" nodeType="withEffect">
+                                <p:cTn id="14" presetID="53" presetClass="entr" presetSubtype="16" fill="hold" nodeType="withEffect">
                                   <p:stCondLst>
                                     <p:cond delay="0"/>
                                   </p:stCondLst>
                                   <p:childTnLst>
                                     <p:set>
                                       <p:cBhvr>
-                                        <p:cTn id="20" dur="1" fill="hold">
+                                        <p:cTn id="15" dur="1" fill="hold">
                                           <p:stCondLst>
                                             <p:cond delay="0"/>
                                           </p:stCondLst>
@@ -29882,7 +29668,7 @@
                                     </p:set>
                                     <p:anim calcmode="lin" valueType="num">
                                       <p:cBhvr>
-                                        <p:cTn id="21" dur="250" fill="hold"/>
+                                        <p:cTn id="16" dur="250" fill="hold"/>
                                         <p:tgtEl>
                                           <p:spTgt spid="6"/>
                                         </p:tgtEl>
@@ -29905,7 +29691,7 @@
                                     </p:anim>
                                     <p:anim calcmode="lin" valueType="num">
                                       <p:cBhvr>
-                                        <p:cTn id="22" dur="250" fill="hold"/>
+                                        <p:cTn id="17" dur="250" fill="hold"/>
                                         <p:tgtEl>
                                           <p:spTgt spid="6"/>
                                         </p:tgtEl>
@@ -29928,7 +29714,7 @@
                                     </p:anim>
                                     <p:animEffect transition="in" filter="fade">
                                       <p:cBhvr>
-                                        <p:cTn id="23" dur="250"/>
+                                        <p:cTn id="18" dur="250"/>
                                         <p:tgtEl>
                                           <p:spTgt spid="6"/>
                                         </p:tgtEl>
@@ -29941,20 +29727,20 @@
                           </p:cTn>
                         </p:par>
                         <p:par>
-                          <p:cTn id="24" fill="hold">
+                          <p:cTn id="19" fill="hold">
                             <p:stCondLst>
-                              <p:cond delay="750"/>
+                              <p:cond delay="500"/>
                             </p:stCondLst>
                             <p:childTnLst>
                               <p:par>
-                                <p:cTn id="25" presetID="53" presetClass="entr" presetSubtype="16" fill="hold" grpId="0" nodeType="afterEffect">
+                                <p:cTn id="20" presetID="53" presetClass="entr" presetSubtype="16" fill="hold" grpId="0" nodeType="afterEffect">
                                   <p:stCondLst>
                                     <p:cond delay="0"/>
                                   </p:stCondLst>
                                   <p:childTnLst>
                                     <p:set>
                                       <p:cBhvr>
-                                        <p:cTn id="26" dur="1" fill="hold">
+                                        <p:cTn id="21" dur="1" fill="hold">
                                           <p:stCondLst>
                                             <p:cond delay="0"/>
                                           </p:stCondLst>
@@ -29972,7 +29758,7 @@
                                     </p:set>
                                     <p:anim calcmode="lin" valueType="num">
                                       <p:cBhvr>
-                                        <p:cTn id="27" dur="250" fill="hold"/>
+                                        <p:cTn id="22" dur="250" fill="hold"/>
                                         <p:tgtEl>
                                           <p:spTgt spid="25"/>
                                         </p:tgtEl>
@@ -29995,7 +29781,7 @@
                                     </p:anim>
                                     <p:anim calcmode="lin" valueType="num">
                                       <p:cBhvr>
-                                        <p:cTn id="28" dur="250" fill="hold"/>
+                                        <p:cTn id="23" dur="250" fill="hold"/>
                                         <p:tgtEl>
                                           <p:spTgt spid="25"/>
                                         </p:tgtEl>
@@ -30018,7 +29804,7 @@
                                     </p:anim>
                                     <p:animEffect transition="in" filter="fade">
                                       <p:cBhvr>
-                                        <p:cTn id="29" dur="250"/>
+                                        <p:cTn id="24" dur="250"/>
                                         <p:tgtEl>
                                           <p:spTgt spid="25"/>
                                         </p:tgtEl>
@@ -30028,14 +29814,14 @@
                                 </p:cTn>
                               </p:par>
                               <p:par>
-                                <p:cTn id="30" presetID="53" presetClass="entr" presetSubtype="16" fill="hold" nodeType="withEffect">
+                                <p:cTn id="25" presetID="53" presetClass="entr" presetSubtype="16" fill="hold" nodeType="withEffect">
                                   <p:stCondLst>
                                     <p:cond delay="0"/>
                                   </p:stCondLst>
                                   <p:childTnLst>
                                     <p:set>
                                       <p:cBhvr>
-                                        <p:cTn id="31" dur="1" fill="hold">
+                                        <p:cTn id="26" dur="1" fill="hold">
                                           <p:stCondLst>
                                             <p:cond delay="0"/>
                                           </p:stCondLst>
@@ -30053,7 +29839,7 @@
                                     </p:set>
                                     <p:anim calcmode="lin" valueType="num">
                                       <p:cBhvr>
-                                        <p:cTn id="32" dur="250" fill="hold"/>
+                                        <p:cTn id="27" dur="250" fill="hold"/>
                                         <p:tgtEl>
                                           <p:spTgt spid="10"/>
                                         </p:tgtEl>
@@ -30076,7 +29862,7 @@
                                     </p:anim>
                                     <p:anim calcmode="lin" valueType="num">
                                       <p:cBhvr>
-                                        <p:cTn id="33" dur="250" fill="hold"/>
+                                        <p:cTn id="28" dur="250" fill="hold"/>
                                         <p:tgtEl>
                                           <p:spTgt spid="10"/>
                                         </p:tgtEl>
@@ -30099,7 +29885,7 @@
                                     </p:anim>
                                     <p:animEffect transition="in" filter="fade">
                                       <p:cBhvr>
-                                        <p:cTn id="34" dur="250"/>
+                                        <p:cTn id="29" dur="250"/>
                                         <p:tgtEl>
                                           <p:spTgt spid="10"/>
                                         </p:tgtEl>
@@ -30112,20 +29898,20 @@
                           </p:cTn>
                         </p:par>
                         <p:par>
-                          <p:cTn id="35" fill="hold">
+                          <p:cTn id="30" fill="hold">
                             <p:stCondLst>
-                              <p:cond delay="1000"/>
+                              <p:cond delay="750"/>
                             </p:stCondLst>
                             <p:childTnLst>
                               <p:par>
-                                <p:cTn id="36" presetID="53" presetClass="entr" presetSubtype="16" fill="hold" grpId="0" nodeType="afterEffect">
+                                <p:cTn id="31" presetID="53" presetClass="entr" presetSubtype="16" fill="hold" grpId="0" nodeType="afterEffect">
                                   <p:stCondLst>
                                     <p:cond delay="0"/>
                                   </p:stCondLst>
                                   <p:childTnLst>
                                     <p:set>
                                       <p:cBhvr>
-                                        <p:cTn id="37" dur="1" fill="hold">
+                                        <p:cTn id="32" dur="1" fill="hold">
                                           <p:stCondLst>
                                             <p:cond delay="0"/>
                                           </p:stCondLst>
@@ -30143,7 +29929,7 @@
                                     </p:set>
                                     <p:anim calcmode="lin" valueType="num">
                                       <p:cBhvr>
-                                        <p:cTn id="38" dur="250" fill="hold"/>
+                                        <p:cTn id="33" dur="250" fill="hold"/>
                                         <p:tgtEl>
                                           <p:spTgt spid="24"/>
                                         </p:tgtEl>
@@ -30166,7 +29952,7 @@
                                     </p:anim>
                                     <p:anim calcmode="lin" valueType="num">
                                       <p:cBhvr>
-                                        <p:cTn id="39" dur="250" fill="hold"/>
+                                        <p:cTn id="34" dur="250" fill="hold"/>
                                         <p:tgtEl>
                                           <p:spTgt spid="24"/>
                                         </p:tgtEl>
@@ -30189,7 +29975,7 @@
                                     </p:anim>
                                     <p:animEffect transition="in" filter="fade">
                                       <p:cBhvr>
-                                        <p:cTn id="40" dur="250"/>
+                                        <p:cTn id="35" dur="250"/>
                                         <p:tgtEl>
                                           <p:spTgt spid="24"/>
                                         </p:tgtEl>
@@ -30199,14 +29985,14 @@
                                 </p:cTn>
                               </p:par>
                               <p:par>
-                                <p:cTn id="41" presetID="53" presetClass="entr" presetSubtype="16" fill="hold" nodeType="withEffect">
+                                <p:cTn id="36" presetID="53" presetClass="entr" presetSubtype="16" fill="hold" nodeType="withEffect">
                                   <p:stCondLst>
                                     <p:cond delay="0"/>
                                   </p:stCondLst>
                                   <p:childTnLst>
                                     <p:set>
                                       <p:cBhvr>
-                                        <p:cTn id="42" dur="1" fill="hold">
+                                        <p:cTn id="37" dur="1" fill="hold">
                                           <p:stCondLst>
                                             <p:cond delay="0"/>
                                           </p:stCondLst>
@@ -30224,7 +30010,7 @@
                                     </p:set>
                                     <p:anim calcmode="lin" valueType="num">
                                       <p:cBhvr>
-                                        <p:cTn id="43" dur="250" fill="hold"/>
+                                        <p:cTn id="38" dur="250" fill="hold"/>
                                         <p:tgtEl>
                                           <p:spTgt spid="12"/>
                                         </p:tgtEl>
@@ -30247,7 +30033,7 @@
                                     </p:anim>
                                     <p:anim calcmode="lin" valueType="num">
                                       <p:cBhvr>
-                                        <p:cTn id="44" dur="250" fill="hold"/>
+                                        <p:cTn id="39" dur="250" fill="hold"/>
                                         <p:tgtEl>
                                           <p:spTgt spid="12"/>
                                         </p:tgtEl>
@@ -30270,7 +30056,7 @@
                                     </p:anim>
                                     <p:animEffect transition="in" filter="fade">
                                       <p:cBhvr>
-                                        <p:cTn id="45" dur="250"/>
+                                        <p:cTn id="40" dur="250"/>
                                         <p:tgtEl>
                                           <p:spTgt spid="12"/>
                                         </p:tgtEl>
@@ -30283,20 +30069,20 @@
                           </p:cTn>
                         </p:par>
                         <p:par>
-                          <p:cTn id="46" fill="hold">
+                          <p:cTn id="41" fill="hold">
                             <p:stCondLst>
-                              <p:cond delay="1250"/>
+                              <p:cond delay="1000"/>
                             </p:stCondLst>
                             <p:childTnLst>
                               <p:par>
-                                <p:cTn id="47" presetID="53" presetClass="entr" presetSubtype="16" fill="hold" grpId="0" nodeType="afterEffect">
+                                <p:cTn id="42" presetID="53" presetClass="entr" presetSubtype="16" fill="hold" grpId="0" nodeType="afterEffect">
                                   <p:stCondLst>
                                     <p:cond delay="0"/>
                                   </p:stCondLst>
                                   <p:childTnLst>
                                     <p:set>
                                       <p:cBhvr>
-                                        <p:cTn id="48" dur="1" fill="hold">
+                                        <p:cTn id="43" dur="1" fill="hold">
                                           <p:stCondLst>
                                             <p:cond delay="0"/>
                                           </p:stCondLst>
@@ -30314,7 +30100,7 @@
                                     </p:set>
                                     <p:anim calcmode="lin" valueType="num">
                                       <p:cBhvr>
-                                        <p:cTn id="49" dur="250" fill="hold"/>
+                                        <p:cTn id="44" dur="250" fill="hold"/>
                                         <p:tgtEl>
                                           <p:spTgt spid="27"/>
                                         </p:tgtEl>
@@ -30337,7 +30123,7 @@
                                     </p:anim>
                                     <p:anim calcmode="lin" valueType="num">
                                       <p:cBhvr>
-                                        <p:cTn id="50" dur="250" fill="hold"/>
+                                        <p:cTn id="45" dur="250" fill="hold"/>
                                         <p:tgtEl>
                                           <p:spTgt spid="27"/>
                                         </p:tgtEl>
@@ -30360,7 +30146,7 @@
                                     </p:anim>
                                     <p:animEffect transition="in" filter="fade">
                                       <p:cBhvr>
-                                        <p:cTn id="51" dur="250"/>
+                                        <p:cTn id="46" dur="250"/>
                                         <p:tgtEl>
                                           <p:spTgt spid="27"/>
                                         </p:tgtEl>
@@ -30370,14 +30156,14 @@
                                 </p:cTn>
                               </p:par>
                               <p:par>
-                                <p:cTn id="52" presetID="53" presetClass="entr" presetSubtype="16" fill="hold" nodeType="withEffect">
+                                <p:cTn id="47" presetID="53" presetClass="entr" presetSubtype="16" fill="hold" nodeType="withEffect">
                                   <p:stCondLst>
                                     <p:cond delay="0"/>
                                   </p:stCondLst>
                                   <p:childTnLst>
                                     <p:set>
                                       <p:cBhvr>
-                                        <p:cTn id="53" dur="1" fill="hold">
+                                        <p:cTn id="48" dur="1" fill="hold">
                                           <p:stCondLst>
                                             <p:cond delay="0"/>
                                           </p:stCondLst>
@@ -30395,7 +30181,7 @@
                                     </p:set>
                                     <p:anim calcmode="lin" valueType="num">
                                       <p:cBhvr>
-                                        <p:cTn id="54" dur="250" fill="hold"/>
+                                        <p:cTn id="49" dur="250" fill="hold"/>
                                         <p:tgtEl>
                                           <p:spTgt spid="16"/>
                                         </p:tgtEl>
@@ -30418,7 +30204,7 @@
                                     </p:anim>
                                     <p:anim calcmode="lin" valueType="num">
                                       <p:cBhvr>
-                                        <p:cTn id="55" dur="250" fill="hold"/>
+                                        <p:cTn id="50" dur="250" fill="hold"/>
                                         <p:tgtEl>
                                           <p:spTgt spid="16"/>
                                         </p:tgtEl>
@@ -30441,7 +30227,7 @@
                                     </p:anim>
                                     <p:animEffect transition="in" filter="fade">
                                       <p:cBhvr>
-                                        <p:cTn id="56" dur="250"/>
+                                        <p:cTn id="51" dur="250"/>
                                         <p:tgtEl>
                                           <p:spTgt spid="16"/>
                                         </p:tgtEl>
@@ -30505,6 +30291,36 @@
           <a:chExt cx="0" cy="0"/>
         </a:xfrm>
       </p:grpSpPr>
+      <p:pic>
+        <p:nvPicPr>
+          <p:cNvPr id="10" name="Picture 9">
+            <a:extLst>
+              <a:ext uri="{FF2B5EF4-FFF2-40B4-BE49-F238E27FC236}">
+                <a16:creationId xmlns:a16="http://schemas.microsoft.com/office/drawing/2014/main" id="{0748EA84-34D9-4926-AE33-9AE057584EE5}"/>
+              </a:ext>
+            </a:extLst>
+          </p:cNvPr>
+          <p:cNvPicPr>
+            <a:picLocks noChangeAspect="1"/>
+          </p:cNvPicPr>
+          <p:nvPr/>
+        </p:nvPicPr>
+        <p:blipFill>
+          <a:blip r:embed="rId3"/>
+          <a:stretch>
+            <a:fillRect/>
+          </a:stretch>
+        </p:blipFill>
+        <p:spPr>
+          <a:xfrm>
+            <a:off x="2550592" y="2089806"/>
+            <a:ext cx="3160136" cy="2067057"/>
+          </a:xfrm>
+          <a:prstGeom prst="rect">
+            <a:avLst/>
+          </a:prstGeom>
+        </p:spPr>
+      </p:pic>
       <p:sp>
         <p:nvSpPr>
           <p:cNvPr id="367" name="Google Shape;367;p15"/>
@@ -31236,66 +31052,6 @@
           </a:p>
         </p:txBody>
       </p:sp>
-      <p:pic>
-        <p:nvPicPr>
-          <p:cNvPr id="4" name="Picture 3">
-            <a:extLst>
-              <a:ext uri="{FF2B5EF4-FFF2-40B4-BE49-F238E27FC236}">
-                <a16:creationId xmlns:a16="http://schemas.microsoft.com/office/drawing/2014/main" id="{D955AD5B-11CA-4761-B246-3703C22905B9}"/>
-              </a:ext>
-            </a:extLst>
-          </p:cNvPr>
-          <p:cNvPicPr>
-            <a:picLocks noChangeAspect="1"/>
-          </p:cNvPicPr>
-          <p:nvPr/>
-        </p:nvPicPr>
-        <p:blipFill>
-          <a:blip r:embed="rId3"/>
-          <a:stretch>
-            <a:fillRect/>
-          </a:stretch>
-        </p:blipFill>
-        <p:spPr>
-          <a:xfrm>
-            <a:off x="2618392" y="2089806"/>
-            <a:ext cx="3089002" cy="2087019"/>
-          </a:xfrm>
-          <a:prstGeom prst="rect">
-            <a:avLst/>
-          </a:prstGeom>
-        </p:spPr>
-      </p:pic>
-      <p:pic>
-        <p:nvPicPr>
-          <p:cNvPr id="7" name="Picture 6">
-            <a:extLst>
-              <a:ext uri="{FF2B5EF4-FFF2-40B4-BE49-F238E27FC236}">
-                <a16:creationId xmlns:a16="http://schemas.microsoft.com/office/drawing/2014/main" id="{C63E622C-A1C2-4BFC-AF1C-7FBDC5A5DFFF}"/>
-              </a:ext>
-            </a:extLst>
-          </p:cNvPr>
-          <p:cNvPicPr>
-            <a:picLocks noChangeAspect="1"/>
-          </p:cNvPicPr>
-          <p:nvPr/>
-        </p:nvPicPr>
-        <p:blipFill>
-          <a:blip r:embed="rId4"/>
-          <a:stretch>
-            <a:fillRect/>
-          </a:stretch>
-        </p:blipFill>
-        <p:spPr>
-          <a:xfrm>
-            <a:off x="5881565" y="2089806"/>
-            <a:ext cx="3102326" cy="2087019"/>
-          </a:xfrm>
-          <a:prstGeom prst="rect">
-            <a:avLst/>
-          </a:prstGeom>
-        </p:spPr>
-      </p:pic>
       <p:cxnSp>
         <p:nvCxnSpPr>
           <p:cNvPr id="6" name="Straight Arrow Connector 5">
@@ -31313,7 +31069,7 @@
         <p:spPr>
           <a:xfrm>
             <a:off x="2082800" y="2289344"/>
-            <a:ext cx="638629" cy="1070713"/>
+            <a:ext cx="612935" cy="942636"/>
           </a:xfrm>
           <a:prstGeom prst="straightConnector1">
             <a:avLst/>
@@ -31429,8 +31185,8 @@
         </p:nvCxnSpPr>
         <p:spPr>
           <a:xfrm flipV="1">
-            <a:off x="2698220" y="3165975"/>
-            <a:ext cx="1169837" cy="1174102"/>
+            <a:off x="2698220" y="3189487"/>
+            <a:ext cx="1005410" cy="1150591"/>
           </a:xfrm>
           <a:prstGeom prst="straightConnector1">
             <a:avLst/>
@@ -31454,6 +31210,36 @@
           </a:fontRef>
         </p:style>
       </p:cxnSp>
+      <p:pic>
+        <p:nvPicPr>
+          <p:cNvPr id="15" name="Picture 14">
+            <a:extLst>
+              <a:ext uri="{FF2B5EF4-FFF2-40B4-BE49-F238E27FC236}">
+                <a16:creationId xmlns:a16="http://schemas.microsoft.com/office/drawing/2014/main" id="{5F4DE4E6-87F2-4CA9-9471-2879D871E316}"/>
+              </a:ext>
+            </a:extLst>
+          </p:cNvPr>
+          <p:cNvPicPr>
+            <a:picLocks noChangeAspect="1"/>
+          </p:cNvPicPr>
+          <p:nvPr/>
+        </p:nvPicPr>
+        <p:blipFill>
+          <a:blip r:embed="rId4"/>
+          <a:stretch>
+            <a:fillRect/>
+          </a:stretch>
+        </p:blipFill>
+        <p:spPr>
+          <a:xfrm>
+            <a:off x="5858356" y="2089806"/>
+            <a:ext cx="3162942" cy="2067057"/>
+          </a:xfrm>
+          <a:prstGeom prst="rect">
+            <a:avLst/>
+          </a:prstGeom>
+        </p:spPr>
+      </p:pic>
     </p:spTree>
     <p:extLst>
       <p:ext uri="{BB962C8B-B14F-4D97-AF65-F5344CB8AC3E}">
@@ -31532,7 +31318,7 @@
                             </p:stCondLst>
                             <p:childTnLst>
                               <p:par>
-                                <p:cTn id="9" presetID="2" presetClass="entr" presetSubtype="4" fill="hold" nodeType="afterEffect">
+                                <p:cTn id="9" presetID="53" presetClass="entr" presetSubtype="16" fill="hold" grpId="0" nodeType="afterEffect">
                                   <p:stCondLst>
                                     <p:cond delay="0"/>
                                   </p:stCondLst>
@@ -31540,170 +31326,6 @@
                                     <p:set>
                                       <p:cBhvr>
                                         <p:cTn id="10" dur="1" fill="hold">
-                                          <p:stCondLst>
-                                            <p:cond delay="0"/>
-                                          </p:stCondLst>
-                                        </p:cTn>
-                                        <p:tgtEl>
-                                          <p:spTgt spid="4"/>
-                                        </p:tgtEl>
-                                        <p:attrNameLst>
-                                          <p:attrName>style.visibility</p:attrName>
-                                        </p:attrNameLst>
-                                      </p:cBhvr>
-                                      <p:to>
-                                        <p:strVal val="visible"/>
-                                      </p:to>
-                                    </p:set>
-                                    <p:anim calcmode="lin" valueType="num">
-                                      <p:cBhvr additive="base">
-                                        <p:cTn id="11" dur="250" fill="hold"/>
-                                        <p:tgtEl>
-                                          <p:spTgt spid="4"/>
-                                        </p:tgtEl>
-                                        <p:attrNameLst>
-                                          <p:attrName>ppt_x</p:attrName>
-                                        </p:attrNameLst>
-                                      </p:cBhvr>
-                                      <p:tavLst>
-                                        <p:tav tm="0">
-                                          <p:val>
-                                            <p:strVal val="#ppt_x"/>
-                                          </p:val>
-                                        </p:tav>
-                                        <p:tav tm="100000">
-                                          <p:val>
-                                            <p:strVal val="#ppt_x"/>
-                                          </p:val>
-                                        </p:tav>
-                                      </p:tavLst>
-                                    </p:anim>
-                                    <p:anim calcmode="lin" valueType="num">
-                                      <p:cBhvr additive="base">
-                                        <p:cTn id="12" dur="250" fill="hold"/>
-                                        <p:tgtEl>
-                                          <p:spTgt spid="4"/>
-                                        </p:tgtEl>
-                                        <p:attrNameLst>
-                                          <p:attrName>ppt_y</p:attrName>
-                                        </p:attrNameLst>
-                                      </p:cBhvr>
-                                      <p:tavLst>
-                                        <p:tav tm="0">
-                                          <p:val>
-                                            <p:strVal val="1+#ppt_h/2"/>
-                                          </p:val>
-                                        </p:tav>
-                                        <p:tav tm="100000">
-                                          <p:val>
-                                            <p:strVal val="#ppt_y"/>
-                                          </p:val>
-                                        </p:tav>
-                                      </p:tavLst>
-                                    </p:anim>
-                                  </p:childTnLst>
-                                </p:cTn>
-                              </p:par>
-                            </p:childTnLst>
-                          </p:cTn>
-                        </p:par>
-                        <p:par>
-                          <p:cTn id="13" fill="hold">
-                            <p:stCondLst>
-                              <p:cond delay="500"/>
-                            </p:stCondLst>
-                            <p:childTnLst>
-                              <p:par>
-                                <p:cTn id="14" presetID="2" presetClass="entr" presetSubtype="4" fill="hold" nodeType="afterEffect">
-                                  <p:stCondLst>
-                                    <p:cond delay="0"/>
-                                  </p:stCondLst>
-                                  <p:childTnLst>
-                                    <p:set>
-                                      <p:cBhvr>
-                                        <p:cTn id="15" dur="1" fill="hold">
-                                          <p:stCondLst>
-                                            <p:cond delay="0"/>
-                                          </p:stCondLst>
-                                        </p:cTn>
-                                        <p:tgtEl>
-                                          <p:spTgt spid="7"/>
-                                        </p:tgtEl>
-                                        <p:attrNameLst>
-                                          <p:attrName>style.visibility</p:attrName>
-                                        </p:attrNameLst>
-                                      </p:cBhvr>
-                                      <p:to>
-                                        <p:strVal val="visible"/>
-                                      </p:to>
-                                    </p:set>
-                                    <p:anim calcmode="lin" valueType="num">
-                                      <p:cBhvr additive="base">
-                                        <p:cTn id="16" dur="250" fill="hold"/>
-                                        <p:tgtEl>
-                                          <p:spTgt spid="7"/>
-                                        </p:tgtEl>
-                                        <p:attrNameLst>
-                                          <p:attrName>ppt_x</p:attrName>
-                                        </p:attrNameLst>
-                                      </p:cBhvr>
-                                      <p:tavLst>
-                                        <p:tav tm="0">
-                                          <p:val>
-                                            <p:strVal val="#ppt_x"/>
-                                          </p:val>
-                                        </p:tav>
-                                        <p:tav tm="100000">
-                                          <p:val>
-                                            <p:strVal val="#ppt_x"/>
-                                          </p:val>
-                                        </p:tav>
-                                      </p:tavLst>
-                                    </p:anim>
-                                    <p:anim calcmode="lin" valueType="num">
-                                      <p:cBhvr additive="base">
-                                        <p:cTn id="17" dur="250" fill="hold"/>
-                                        <p:tgtEl>
-                                          <p:spTgt spid="7"/>
-                                        </p:tgtEl>
-                                        <p:attrNameLst>
-                                          <p:attrName>ppt_y</p:attrName>
-                                        </p:attrNameLst>
-                                      </p:cBhvr>
-                                      <p:tavLst>
-                                        <p:tav tm="0">
-                                          <p:val>
-                                            <p:strVal val="1+#ppt_h/2"/>
-                                          </p:val>
-                                        </p:tav>
-                                        <p:tav tm="100000">
-                                          <p:val>
-                                            <p:strVal val="#ppt_y"/>
-                                          </p:val>
-                                        </p:tav>
-                                      </p:tavLst>
-                                    </p:anim>
-                                  </p:childTnLst>
-                                </p:cTn>
-                              </p:par>
-                            </p:childTnLst>
-                          </p:cTn>
-                        </p:par>
-                        <p:par>
-                          <p:cTn id="18" fill="hold">
-                            <p:stCondLst>
-                              <p:cond delay="750"/>
-                            </p:stCondLst>
-                            <p:childTnLst>
-                              <p:par>
-                                <p:cTn id="19" presetID="53" presetClass="entr" presetSubtype="16" fill="hold" grpId="0" nodeType="afterEffect">
-                                  <p:stCondLst>
-                                    <p:cond delay="0"/>
-                                  </p:stCondLst>
-                                  <p:childTnLst>
-                                    <p:set>
-                                      <p:cBhvr>
-                                        <p:cTn id="20" dur="1" fill="hold">
                                           <p:stCondLst>
                                             <p:cond delay="0"/>
                                           </p:stCondLst>
@@ -31721,7 +31343,7 @@
                                     </p:set>
                                     <p:anim calcmode="lin" valueType="num">
                                       <p:cBhvr>
-                                        <p:cTn id="21" dur="250" fill="hold"/>
+                                        <p:cTn id="11" dur="250" fill="hold"/>
                                         <p:tgtEl>
                                           <p:spTgt spid="21"/>
                                         </p:tgtEl>
@@ -31744,7 +31366,7 @@
                                     </p:anim>
                                     <p:anim calcmode="lin" valueType="num">
                                       <p:cBhvr>
-                                        <p:cTn id="22" dur="250" fill="hold"/>
+                                        <p:cTn id="12" dur="250" fill="hold"/>
                                         <p:tgtEl>
                                           <p:spTgt spid="21"/>
                                         </p:tgtEl>
@@ -31767,7 +31389,7 @@
                                     </p:anim>
                                     <p:animEffect transition="in" filter="fade">
                                       <p:cBhvr>
-                                        <p:cTn id="23" dur="250"/>
+                                        <p:cTn id="13" dur="250"/>
                                         <p:tgtEl>
                                           <p:spTgt spid="21"/>
                                         </p:tgtEl>
@@ -31777,14 +31399,14 @@
                                 </p:cTn>
                               </p:par>
                               <p:par>
-                                <p:cTn id="24" presetID="53" presetClass="entr" presetSubtype="16" fill="hold" nodeType="withEffect">
+                                <p:cTn id="14" presetID="53" presetClass="entr" presetSubtype="16" fill="hold" nodeType="withEffect">
                                   <p:stCondLst>
                                     <p:cond delay="0"/>
                                   </p:stCondLst>
                                   <p:childTnLst>
                                     <p:set>
                                       <p:cBhvr>
-                                        <p:cTn id="25" dur="1" fill="hold">
+                                        <p:cTn id="15" dur="1" fill="hold">
                                           <p:stCondLst>
                                             <p:cond delay="0"/>
                                           </p:stCondLst>
@@ -31802,7 +31424,7 @@
                                     </p:set>
                                     <p:anim calcmode="lin" valueType="num">
                                       <p:cBhvr>
-                                        <p:cTn id="26" dur="250" fill="hold"/>
+                                        <p:cTn id="16" dur="250" fill="hold"/>
                                         <p:tgtEl>
                                           <p:spTgt spid="6"/>
                                         </p:tgtEl>
@@ -31825,7 +31447,7 @@
                                     </p:anim>
                                     <p:anim calcmode="lin" valueType="num">
                                       <p:cBhvr>
-                                        <p:cTn id="27" dur="250" fill="hold"/>
+                                        <p:cTn id="17" dur="250" fill="hold"/>
                                         <p:tgtEl>
                                           <p:spTgt spid="6"/>
                                         </p:tgtEl>
@@ -31848,7 +31470,7 @@
                                     </p:anim>
                                     <p:animEffect transition="in" filter="fade">
                                       <p:cBhvr>
-                                        <p:cTn id="28" dur="250"/>
+                                        <p:cTn id="18" dur="250"/>
                                         <p:tgtEl>
                                           <p:spTgt spid="6"/>
                                         </p:tgtEl>
@@ -31861,20 +31483,20 @@
                           </p:cTn>
                         </p:par>
                         <p:par>
-                          <p:cTn id="29" fill="hold">
+                          <p:cTn id="19" fill="hold">
                             <p:stCondLst>
-                              <p:cond delay="1000"/>
+                              <p:cond delay="500"/>
                             </p:stCondLst>
                             <p:childTnLst>
                               <p:par>
-                                <p:cTn id="30" presetID="53" presetClass="entr" presetSubtype="16" fill="hold" grpId="0" nodeType="afterEffect">
+                                <p:cTn id="20" presetID="53" presetClass="entr" presetSubtype="16" fill="hold" grpId="0" nodeType="afterEffect">
                                   <p:stCondLst>
                                     <p:cond delay="0"/>
                                   </p:stCondLst>
                                   <p:childTnLst>
                                     <p:set>
                                       <p:cBhvr>
-                                        <p:cTn id="31" dur="1" fill="hold">
+                                        <p:cTn id="21" dur="1" fill="hold">
                                           <p:stCondLst>
                                             <p:cond delay="0"/>
                                           </p:stCondLst>
@@ -31892,7 +31514,7 @@
                                     </p:set>
                                     <p:anim calcmode="lin" valueType="num">
                                       <p:cBhvr>
-                                        <p:cTn id="32" dur="250" fill="hold"/>
+                                        <p:cTn id="22" dur="250" fill="hold"/>
                                         <p:tgtEl>
                                           <p:spTgt spid="22"/>
                                         </p:tgtEl>
@@ -31915,7 +31537,7 @@
                                     </p:anim>
                                     <p:anim calcmode="lin" valueType="num">
                                       <p:cBhvr>
-                                        <p:cTn id="33" dur="250" fill="hold"/>
+                                        <p:cTn id="23" dur="250" fill="hold"/>
                                         <p:tgtEl>
                                           <p:spTgt spid="22"/>
                                         </p:tgtEl>
@@ -31938,7 +31560,7 @@
                                     </p:anim>
                                     <p:animEffect transition="in" filter="fade">
                                       <p:cBhvr>
-                                        <p:cTn id="34" dur="250"/>
+                                        <p:cTn id="24" dur="250"/>
                                         <p:tgtEl>
                                           <p:spTgt spid="22"/>
                                         </p:tgtEl>
@@ -31948,14 +31570,14 @@
                                 </p:cTn>
                               </p:par>
                               <p:par>
-                                <p:cTn id="35" presetID="53" presetClass="entr" presetSubtype="16" fill="hold" nodeType="withEffect">
+                                <p:cTn id="25" presetID="53" presetClass="entr" presetSubtype="16" fill="hold" nodeType="withEffect">
                                   <p:stCondLst>
                                     <p:cond delay="0"/>
                                   </p:stCondLst>
                                   <p:childTnLst>
                                     <p:set>
                                       <p:cBhvr>
-                                        <p:cTn id="36" dur="1" fill="hold">
+                                        <p:cTn id="26" dur="1" fill="hold">
                                           <p:stCondLst>
                                             <p:cond delay="0"/>
                                           </p:stCondLst>
@@ -31973,7 +31595,7 @@
                                     </p:set>
                                     <p:anim calcmode="lin" valueType="num">
                                       <p:cBhvr>
-                                        <p:cTn id="37" dur="250" fill="hold"/>
+                                        <p:cTn id="27" dur="250" fill="hold"/>
                                         <p:tgtEl>
                                           <p:spTgt spid="23"/>
                                         </p:tgtEl>
@@ -31996,7 +31618,7 @@
                                     </p:anim>
                                     <p:anim calcmode="lin" valueType="num">
                                       <p:cBhvr>
-                                        <p:cTn id="38" dur="250" fill="hold"/>
+                                        <p:cTn id="28" dur="250" fill="hold"/>
                                         <p:tgtEl>
                                           <p:spTgt spid="23"/>
                                         </p:tgtEl>
@@ -32019,7 +31641,7 @@
                                     </p:anim>
                                     <p:animEffect transition="in" filter="fade">
                                       <p:cBhvr>
-                                        <p:cTn id="39" dur="250"/>
+                                        <p:cTn id="29" dur="250"/>
                                         <p:tgtEl>
                                           <p:spTgt spid="23"/>
                                         </p:tgtEl>
@@ -33608,7 +33230,7 @@
         </p:nvGrpSpPr>
         <p:grpSpPr>
           <a:xfrm>
-            <a:off x="5953279" y="3988545"/>
+            <a:off x="5930387" y="3757713"/>
             <a:ext cx="2065020" cy="834782"/>
             <a:chOff x="2156460" y="2921390"/>
             <a:chExt cx="2065020" cy="834782"/>
@@ -33659,7 +33281,7 @@
             <a:p>
               <a:pPr algn="ctr"/>
               <a:r>
-                <a:rPr lang="en-US" sz="1400" b="1" err="1">
+                <a:rPr lang="en-US" sz="1400" b="1" dirty="0" err="1">
                   <a:solidFill>
                     <a:schemeClr val="bg1"/>
                   </a:solidFill>
@@ -33667,7 +33289,7 @@
                 <a:t>Huỳnh</a:t>
               </a:r>
               <a:r>
-                <a:rPr lang="en-US" sz="1400" b="1">
+                <a:rPr lang="en-US" sz="1400" b="1" dirty="0">
                   <a:solidFill>
                     <a:schemeClr val="bg1"/>
                   </a:solidFill>
@@ -33675,7 +33297,7 @@
                 <a:t> </a:t>
               </a:r>
               <a:r>
-                <a:rPr lang="en-US" sz="1400" b="1" err="1">
+                <a:rPr lang="en-US" sz="1400" b="1" dirty="0" err="1">
                   <a:solidFill>
                     <a:schemeClr val="bg1"/>
                   </a:solidFill>
@@ -33683,7 +33305,7 @@
                 <a:t>Phước</a:t>
               </a:r>
               <a:r>
-                <a:rPr lang="en-US" sz="1400" b="1">
+                <a:rPr lang="en-US" sz="1400" b="1" dirty="0">
                   <a:solidFill>
                     <a:schemeClr val="bg1"/>
                   </a:solidFill>
@@ -34127,7 +33749,7 @@
           <p:nvPr/>
         </p:nvPicPr>
         <p:blipFill>
-          <a:blip r:embed="rId3"/>
+          <a:blip r:embed="rId4"/>
           <a:stretch>
             <a:fillRect/>
           </a:stretch>
@@ -34157,25 +33779,25 @@
           <p:nvPr>
             <p:extLst>
               <p:ext uri="{D42A27DB-BD31-4B8C-83A1-F6EECF244321}">
-                <p14:modId xmlns:p14="http://schemas.microsoft.com/office/powerpoint/2010/main" val="2079454515"/>
+                <p14:modId xmlns:p14="http://schemas.microsoft.com/office/powerpoint/2010/main" val="289637661"/>
               </p:ext>
             </p:extLst>
           </p:nvPr>
         </p:nvGraphicFramePr>
         <p:xfrm>
-          <a:off x="6230404" y="1841540"/>
+          <a:off x="6122350" y="1705288"/>
           <a:ext cx="1510770" cy="2004720"/>
         </p:xfrm>
         <a:graphic>
           <a:graphicData uri="http://schemas.openxmlformats.org/presentationml/2006/ole">
             <mc:AlternateContent xmlns:mc="http://schemas.openxmlformats.org/markup-compatibility/2006">
               <mc:Choice xmlns:v="urn:schemas-microsoft-com:vml" Requires="v">
-                <p:oleObj name="Bitmap Image" r:id="rId4" imgW="2072520" imgH="2750760" progId="Paint.Picture">
+                <p:oleObj spid="_x0000_s1030" name="Bitmap Image" r:id="rId5" imgW="2072520" imgH="2750760" progId="Paint.Picture">
                   <p:embed/>
                 </p:oleObj>
               </mc:Choice>
               <mc:Fallback>
-                <p:oleObj name="Bitmap Image" r:id="rId4" imgW="2072520" imgH="2750760" progId="Paint.Picture">
+                <p:oleObj name="Bitmap Image" r:id="rId5" imgW="2072520" imgH="2750760" progId="Paint.Picture">
                   <p:embed/>
                   <p:pic>
                     <p:nvPicPr>
@@ -34190,14 +33812,14 @@
                       <p:nvPr/>
                     </p:nvPicPr>
                     <p:blipFill>
-                      <a:blip r:embed="rId5"/>
+                      <a:blip r:embed="rId6"/>
                       <a:stretch>
                         <a:fillRect/>
                       </a:stretch>
                     </p:blipFill>
                     <p:spPr>
                       <a:xfrm>
-                        <a:off x="6230404" y="1841540"/>
+                        <a:off x="6122350" y="1705288"/>
                         <a:ext cx="1510770" cy="2004720"/>
                       </a:xfrm>
                       <a:prstGeom prst="rect">
@@ -34239,12 +33861,12 @@
           <a:graphicData uri="http://schemas.openxmlformats.org/presentationml/2006/ole">
             <mc:AlternateContent xmlns:mc="http://schemas.openxmlformats.org/markup-compatibility/2006">
               <mc:Choice xmlns:v="urn:schemas-microsoft-com:vml" Requires="v">
-                <p:oleObj name="Bitmap Image" r:id="rId6" imgW="3009960" imgH="3787200" progId="Paint.Picture">
+                <p:oleObj spid="_x0000_s1031" name="Bitmap Image" r:id="rId7" imgW="3009960" imgH="3787200" progId="Paint.Picture">
                   <p:embed/>
                 </p:oleObj>
               </mc:Choice>
               <mc:Fallback>
-                <p:oleObj name="Bitmap Image" r:id="rId6" imgW="3009960" imgH="3787200" progId="Paint.Picture">
+                <p:oleObj name="Bitmap Image" r:id="rId7" imgW="3009960" imgH="3787200" progId="Paint.Picture">
                   <p:embed/>
                   <p:pic>
                     <p:nvPicPr>
@@ -34259,7 +33881,7 @@
                       <p:nvPr/>
                     </p:nvPicPr>
                     <p:blipFill>
-                      <a:blip r:embed="rId7"/>
+                      <a:blip r:embed="rId8"/>
                       <a:stretch>
                         <a:fillRect/>
                       </a:stretch>
@@ -34759,7 +34381,7 @@
               <a:buAutoNum type="romanUcPeriod"/>
             </a:pPr>
             <a:r>
-              <a:rPr lang="en-US" sz="1600" b="1">
+              <a:rPr lang="en-US" sz="1600" b="1" dirty="0">
                 <a:solidFill>
                   <a:schemeClr val="bg1"/>
                 </a:solidFill>
@@ -34770,7 +34392,7 @@
               </a:rPr>
               <a:t>TỔNG QUAN VỀ GIAO THỨC TCP VÀ THUẬT TOÁN VIGENERE</a:t>
             </a:r>
-            <a:endParaRPr lang="vi-VN" sz="1600" b="1">
+            <a:endParaRPr lang="vi-VN" sz="1600" b="1" dirty="0">
               <a:solidFill>
                 <a:schemeClr val="bg1"/>
               </a:solidFill>
@@ -34796,7 +34418,7 @@
               <a:buAutoNum type="romanUcPeriod"/>
             </a:pPr>
             <a:r>
-              <a:rPr lang="vi-VN" sz="1600" b="1">
+              <a:rPr lang="vi-VN" sz="1600" b="1" dirty="0">
                 <a:solidFill>
                   <a:schemeClr val="bg1"/>
                 </a:solidFill>
@@ -34808,7 +34430,7 @@
               <a:t> </a:t>
             </a:r>
             <a:r>
-              <a:rPr lang="en-US" sz="1600" b="1">
+              <a:rPr lang="en-US" sz="1600" b="1" dirty="0">
                 <a:solidFill>
                   <a:schemeClr val="bg1"/>
                 </a:solidFill>
@@ -34819,7 +34441,7 @@
               </a:rPr>
               <a:t>XÂY DỰNG CHƯƠNG TRÌNH</a:t>
             </a:r>
-            <a:endParaRPr lang="vi-VN" sz="1600" b="1">
+            <a:endParaRPr lang="vi-VN" sz="1600" b="1" dirty="0">
               <a:solidFill>
                 <a:schemeClr val="bg1"/>
               </a:solidFill>
@@ -34845,7 +34467,7 @@
               <a:buAutoNum type="romanUcPeriod"/>
             </a:pPr>
             <a:r>
-              <a:rPr lang="en-US" sz="1600" b="1">
+              <a:rPr lang="en-US" sz="1600" b="1" dirty="0">
                 <a:solidFill>
                   <a:schemeClr val="bg1"/>
                 </a:solidFill>
@@ -34856,68 +34478,7 @@
               </a:rPr>
               <a:t>DEMO</a:t>
             </a:r>
-            <a:endParaRPr lang="vi-VN" sz="1600" b="1">
-              <a:solidFill>
-                <a:schemeClr val="bg1"/>
-              </a:solidFill>
-              <a:latin typeface="Muli"/>
-              <a:ea typeface="Muli"/>
-              <a:cs typeface="Muli"/>
-              <a:sym typeface="Muli"/>
-            </a:endParaRPr>
-          </a:p>
-          <a:p>
-            <a:pPr marL="285750" lvl="0" indent="-285750">
-              <a:lnSpc>
-                <a:spcPct val="150000"/>
-              </a:lnSpc>
-              <a:spcBef>
-                <a:spcPts val="600"/>
-              </a:spcBef>
-              <a:buClr>
-                <a:schemeClr val="bg1"/>
-              </a:buClr>
-              <a:buSzPct val="100000"/>
-              <a:buFont typeface="+mj-lt"/>
-              <a:buAutoNum type="romanUcPeriod"/>
-            </a:pPr>
-            <a:r>
-              <a:rPr lang="en-US" sz="1600" b="1">
-                <a:solidFill>
-                  <a:schemeClr val="bg1"/>
-                </a:solidFill>
-                <a:latin typeface="Muli"/>
-                <a:ea typeface="Muli"/>
-                <a:cs typeface="Muli"/>
-                <a:sym typeface="Muli"/>
-              </a:rPr>
-              <a:t>TỔNG KẾT</a:t>
-            </a:r>
-            <a:endParaRPr lang="vi-VN" sz="1600" b="1">
-              <a:solidFill>
-                <a:srgbClr val="C6DAEC"/>
-              </a:solidFill>
-              <a:latin typeface="Muli"/>
-              <a:ea typeface="Muli"/>
-              <a:cs typeface="Muli"/>
-              <a:sym typeface="Muli"/>
-            </a:endParaRPr>
-          </a:p>
-          <a:p>
-            <a:pPr marL="285750" lvl="0" indent="-285750" algn="l" rtl="0">
-              <a:spcBef>
-                <a:spcPts val="600"/>
-              </a:spcBef>
-              <a:spcAft>
-                <a:spcPts val="0"/>
-              </a:spcAft>
-              <a:buClr>
-                <a:schemeClr val="bg1"/>
-              </a:buClr>
-              <a:buFont typeface="+mj-lt"/>
-              <a:buAutoNum type="romanUcPeriod"/>
-            </a:pPr>
-            <a:endParaRPr lang="vi-VN" sz="1600" b="1">
+            <a:endParaRPr lang="vi-VN" sz="1600" b="1" dirty="0">
               <a:solidFill>
                 <a:srgbClr val="C6DAEC"/>
               </a:solidFill>
@@ -36956,7 +36517,7 @@
               <a:buNone/>
             </a:pPr>
             <a:r>
-              <a:rPr lang="en-US" sz="1400">
+              <a:rPr lang="en-US" sz="1400" dirty="0">
                 <a:solidFill>
                   <a:schemeClr val="bg1"/>
                 </a:solidFill>
@@ -36965,7 +36526,7 @@
               <a:t>  </a:t>
             </a:r>
             <a:r>
-              <a:rPr lang="vi-VN" sz="1400">
+              <a:rPr lang="vi-VN" sz="1400" dirty="0">
                 <a:solidFill>
                   <a:schemeClr val="bg1"/>
                 </a:solidFill>
@@ -36974,7 +36535,7 @@
               <a:t>Mật mã Vigen</a:t>
             </a:r>
             <a:r>
-              <a:rPr lang="en-US" sz="1400">
+              <a:rPr lang="en-US" sz="1400" dirty="0">
                 <a:solidFill>
                   <a:schemeClr val="bg1"/>
                 </a:solidFill>
@@ -36983,7 +36544,7 @@
               <a:t>e</a:t>
             </a:r>
             <a:r>
-              <a:rPr lang="vi-VN" sz="1400">
+              <a:rPr lang="vi-VN" sz="1400" dirty="0">
                 <a:solidFill>
                   <a:schemeClr val="bg1"/>
                 </a:solidFill>
@@ -36991,7 +36552,7 @@
               </a:rPr>
               <a:t>re là một phương pháp mã hóa văn bản bằng cách sử dụng xen kẽ một số phép mã hóa Caesar khác nhau dựa trên các chữ cái của một từ khóa.</a:t>
             </a:r>
-            <a:endParaRPr lang="en-US" sz="1400">
+            <a:endParaRPr lang="en-US" sz="1400" dirty="0">
               <a:solidFill>
                 <a:schemeClr val="bg1"/>
               </a:solidFill>
@@ -37005,7 +36566,7 @@
               <a:buChar char="v"/>
             </a:pPr>
             <a:r>
-              <a:rPr lang="en-US" sz="1400" b="1" err="1">
+              <a:rPr lang="en-US" sz="1400" b="1" dirty="0" err="1">
                 <a:solidFill>
                   <a:schemeClr val="bg1"/>
                 </a:solidFill>
@@ -37014,7 +36575,7 @@
               <a:t>Mã</a:t>
             </a:r>
             <a:r>
-              <a:rPr lang="en-US" sz="1400" b="1">
+              <a:rPr lang="en-US" sz="1400" b="1" dirty="0">
                 <a:solidFill>
                   <a:schemeClr val="bg1"/>
                 </a:solidFill>
@@ -37023,7 +36584,7 @@
               <a:t> </a:t>
             </a:r>
             <a:r>
-              <a:rPr lang="en-US" sz="1400" b="1" err="1">
+              <a:rPr lang="en-US" sz="1400" b="1" dirty="0" err="1">
                 <a:solidFill>
                   <a:schemeClr val="bg1"/>
                 </a:solidFill>
@@ -37031,7 +36592,7 @@
               </a:rPr>
               <a:t>hóa</a:t>
             </a:r>
-            <a:endParaRPr lang="en-US" sz="1400" b="1">
+            <a:endParaRPr lang="en-US" sz="1400" b="1" dirty="0">
               <a:solidFill>
                 <a:schemeClr val="bg1"/>
               </a:solidFill>
@@ -37043,7 +36604,7 @@
               <a:buNone/>
             </a:pPr>
             <a:r>
-              <a:rPr lang="en-US" sz="1400">
+              <a:rPr lang="en-US" sz="1400" dirty="0">
                 <a:solidFill>
                   <a:schemeClr val="bg1"/>
                 </a:solidFill>
@@ -37052,7 +36613,7 @@
               <a:t>  </a:t>
             </a:r>
             <a:r>
-              <a:rPr lang="vi-VN" sz="1400">
+              <a:rPr lang="vi-VN" sz="1400" dirty="0">
                 <a:solidFill>
                   <a:schemeClr val="bg1"/>
                 </a:solidFill>
@@ -37061,7 +36622,7 @@
               <a:t>Trong mã hóa Vigen</a:t>
             </a:r>
             <a:r>
-              <a:rPr lang="en-US" sz="1400">
+              <a:rPr lang="en-US" sz="1400" dirty="0">
                 <a:solidFill>
                   <a:schemeClr val="bg1"/>
                 </a:solidFill>
@@ -37070,7 +36631,7 @@
               <a:t>e</a:t>
             </a:r>
             <a:r>
-              <a:rPr lang="vi-VN" sz="1400">
+              <a:rPr lang="vi-VN" sz="1400" dirty="0">
                 <a:solidFill>
                   <a:schemeClr val="bg1"/>
                 </a:solidFill>
@@ -37079,7 +36640,7 @@
               <a:t>re thì </a:t>
             </a:r>
             <a:r>
-              <a:rPr lang="en-US" sz="1400">
+              <a:rPr lang="en-US" sz="1400" dirty="0">
                 <a:solidFill>
                   <a:schemeClr val="bg1"/>
                 </a:solidFill>
@@ -37088,7 +36649,7 @@
               <a:t>t</a:t>
             </a:r>
             <a:r>
-              <a:rPr lang="vi-VN" sz="1400">
+              <a:rPr lang="vi-VN" sz="1400" dirty="0">
                 <a:solidFill>
                   <a:schemeClr val="bg1"/>
                 </a:solidFill>
@@ -37097,7 +36658,7 @@
               <a:t>a sẽ sử dụng một bảng để làm phép dịch, và một chuỗi khóa gọi là key, thay vì một số như trong mã hóa Caesar.</a:t>
             </a:r>
             <a:r>
-              <a:rPr lang="en-US" sz="1400">
+              <a:rPr lang="en-US" sz="1400" dirty="0">
                 <a:solidFill>
                   <a:schemeClr val="bg1"/>
                 </a:solidFill>
@@ -37110,7 +36671,7 @@
             <a:pPr marL="76200" indent="0">
               <a:buNone/>
             </a:pPr>
-            <a:endParaRPr lang="en-US" sz="1400">
+            <a:endParaRPr lang="en-US" sz="1400" dirty="0">
               <a:solidFill>
                 <a:schemeClr val="bg1"/>
               </a:solidFill>

</xml_diff>